<commit_message>
set up for fault test instances
</commit_message>
<xml_diff>
--- a/TestInstances/GeologyScenarioForTesting.pptx
+++ b/TestInstances/GeologyScenarioForTesting.pptx
@@ -6,6 +6,7 @@
   </p:sldMasterIdLst>
   <p:sldIdLst>
     <p:sldId id="256" r:id="rId2"/>
+    <p:sldId id="257" r:id="rId3"/>
   </p:sldIdLst>
   <p:sldSz cx="10058400" cy="6858000"/>
   <p:notesSz cx="6858000" cy="9144000"/>
@@ -154,7 +155,7 @@
           </a:lstStyle>
           <a:p>
             <a:r>
-              <a:rPr lang="en-US" smtClean="0"/>
+              <a:rPr lang="en-US"/>
               <a:t>Click to edit Master title style</a:t>
             </a:r>
             <a:endParaRPr lang="en-US" dirty="0"/>
@@ -219,7 +220,7 @@
           </a:lstStyle>
           <a:p>
             <a:r>
-              <a:rPr lang="en-US" smtClean="0"/>
+              <a:rPr lang="en-US"/>
               <a:t>Click to edit Master subtitle style</a:t>
             </a:r>
             <a:endParaRPr lang="en-US" dirty="0"/>
@@ -243,7 +244,7 @@
           <a:p>
             <a:fld id="{F3F0FDFC-A3F0-49EF-9F9E-7E3065794AD8}" type="datetimeFigureOut">
               <a:rPr lang="en-US" smtClean="0"/>
-              <a:t>3/27/2019</a:t>
+              <a:t>10/21/2019</a:t>
             </a:fld>
             <a:endParaRPr lang="en-US"/>
           </a:p>
@@ -337,7 +338,7 @@
           <a:lstStyle/>
           <a:p>
             <a:r>
-              <a:rPr lang="en-US" smtClean="0"/>
+              <a:rPr lang="en-US"/>
               <a:t>Click to edit Master title style</a:t>
             </a:r>
             <a:endParaRPr lang="en-US" dirty="0"/>
@@ -361,35 +362,35 @@
           <a:p>
             <a:pPr lvl="0"/>
             <a:r>
-              <a:rPr lang="en-US" smtClean="0"/>
+              <a:rPr lang="en-US"/>
               <a:t>Edit Master text styles</a:t>
             </a:r>
           </a:p>
           <a:p>
             <a:pPr lvl="1"/>
             <a:r>
-              <a:rPr lang="en-US" smtClean="0"/>
+              <a:rPr lang="en-US"/>
               <a:t>Second level</a:t>
             </a:r>
           </a:p>
           <a:p>
             <a:pPr lvl="2"/>
             <a:r>
-              <a:rPr lang="en-US" smtClean="0"/>
+              <a:rPr lang="en-US"/>
               <a:t>Third level</a:t>
             </a:r>
           </a:p>
           <a:p>
             <a:pPr lvl="3"/>
             <a:r>
-              <a:rPr lang="en-US" smtClean="0"/>
+              <a:rPr lang="en-US"/>
               <a:t>Fourth level</a:t>
             </a:r>
           </a:p>
           <a:p>
             <a:pPr lvl="4"/>
             <a:r>
-              <a:rPr lang="en-US" smtClean="0"/>
+              <a:rPr lang="en-US"/>
               <a:t>Fifth level</a:t>
             </a:r>
             <a:endParaRPr lang="en-US" dirty="0"/>
@@ -413,7 +414,7 @@
           <a:p>
             <a:fld id="{F3F0FDFC-A3F0-49EF-9F9E-7E3065794AD8}" type="datetimeFigureOut">
               <a:rPr lang="en-US" smtClean="0"/>
-              <a:t>3/27/2019</a:t>
+              <a:t>10/21/2019</a:t>
             </a:fld>
             <a:endParaRPr lang="en-US"/>
           </a:p>
@@ -512,7 +513,7 @@
           <a:lstStyle/>
           <a:p>
             <a:r>
-              <a:rPr lang="en-US" smtClean="0"/>
+              <a:rPr lang="en-US"/>
               <a:t>Click to edit Master title style</a:t>
             </a:r>
             <a:endParaRPr lang="en-US" dirty="0"/>
@@ -541,35 +542,35 @@
           <a:p>
             <a:pPr lvl="0"/>
             <a:r>
-              <a:rPr lang="en-US" smtClean="0"/>
+              <a:rPr lang="en-US"/>
               <a:t>Edit Master text styles</a:t>
             </a:r>
           </a:p>
           <a:p>
             <a:pPr lvl="1"/>
             <a:r>
-              <a:rPr lang="en-US" smtClean="0"/>
+              <a:rPr lang="en-US"/>
               <a:t>Second level</a:t>
             </a:r>
           </a:p>
           <a:p>
             <a:pPr lvl="2"/>
             <a:r>
-              <a:rPr lang="en-US" smtClean="0"/>
+              <a:rPr lang="en-US"/>
               <a:t>Third level</a:t>
             </a:r>
           </a:p>
           <a:p>
             <a:pPr lvl="3"/>
             <a:r>
-              <a:rPr lang="en-US" smtClean="0"/>
+              <a:rPr lang="en-US"/>
               <a:t>Fourth level</a:t>
             </a:r>
           </a:p>
           <a:p>
             <a:pPr lvl="4"/>
             <a:r>
-              <a:rPr lang="en-US" smtClean="0"/>
+              <a:rPr lang="en-US"/>
               <a:t>Fifth level</a:t>
             </a:r>
             <a:endParaRPr lang="en-US" dirty="0"/>
@@ -593,7 +594,7 @@
           <a:p>
             <a:fld id="{F3F0FDFC-A3F0-49EF-9F9E-7E3065794AD8}" type="datetimeFigureOut">
               <a:rPr lang="en-US" smtClean="0"/>
-              <a:t>3/27/2019</a:t>
+              <a:t>10/21/2019</a:t>
             </a:fld>
             <a:endParaRPr lang="en-US"/>
           </a:p>
@@ -687,7 +688,7 @@
           <a:lstStyle/>
           <a:p>
             <a:r>
-              <a:rPr lang="en-US" smtClean="0"/>
+              <a:rPr lang="en-US"/>
               <a:t>Click to edit Master title style</a:t>
             </a:r>
             <a:endParaRPr lang="en-US" dirty="0"/>
@@ -711,35 +712,35 @@
           <a:p>
             <a:pPr lvl="0"/>
             <a:r>
-              <a:rPr lang="en-US" smtClean="0"/>
+              <a:rPr lang="en-US"/>
               <a:t>Edit Master text styles</a:t>
             </a:r>
           </a:p>
           <a:p>
             <a:pPr lvl="1"/>
             <a:r>
-              <a:rPr lang="en-US" smtClean="0"/>
+              <a:rPr lang="en-US"/>
               <a:t>Second level</a:t>
             </a:r>
           </a:p>
           <a:p>
             <a:pPr lvl="2"/>
             <a:r>
-              <a:rPr lang="en-US" smtClean="0"/>
+              <a:rPr lang="en-US"/>
               <a:t>Third level</a:t>
             </a:r>
           </a:p>
           <a:p>
             <a:pPr lvl="3"/>
             <a:r>
-              <a:rPr lang="en-US" smtClean="0"/>
+              <a:rPr lang="en-US"/>
               <a:t>Fourth level</a:t>
             </a:r>
           </a:p>
           <a:p>
             <a:pPr lvl="4"/>
             <a:r>
-              <a:rPr lang="en-US" smtClean="0"/>
+              <a:rPr lang="en-US"/>
               <a:t>Fifth level</a:t>
             </a:r>
             <a:endParaRPr lang="en-US" dirty="0"/>
@@ -763,7 +764,7 @@
           <a:p>
             <a:fld id="{F3F0FDFC-A3F0-49EF-9F9E-7E3065794AD8}" type="datetimeFigureOut">
               <a:rPr lang="en-US" smtClean="0"/>
-              <a:t>3/27/2019</a:t>
+              <a:t>10/21/2019</a:t>
             </a:fld>
             <a:endParaRPr lang="en-US"/>
           </a:p>
@@ -866,7 +867,7 @@
           </a:lstStyle>
           <a:p>
             <a:r>
-              <a:rPr lang="en-US" smtClean="0"/>
+              <a:rPr lang="en-US"/>
               <a:t>Click to edit Master title style</a:t>
             </a:r>
             <a:endParaRPr lang="en-US" dirty="0"/>
@@ -984,7 +985,7 @@
           <a:p>
             <a:pPr lvl="0"/>
             <a:r>
-              <a:rPr lang="en-US" smtClean="0"/>
+              <a:rPr lang="en-US"/>
               <a:t>Edit Master text styles</a:t>
             </a:r>
           </a:p>
@@ -1007,7 +1008,7 @@
           <a:p>
             <a:fld id="{F3F0FDFC-A3F0-49EF-9F9E-7E3065794AD8}" type="datetimeFigureOut">
               <a:rPr lang="en-US" smtClean="0"/>
-              <a:t>3/27/2019</a:t>
+              <a:t>10/21/2019</a:t>
             </a:fld>
             <a:endParaRPr lang="en-US"/>
           </a:p>
@@ -1101,7 +1102,7 @@
           <a:lstStyle/>
           <a:p>
             <a:r>
-              <a:rPr lang="en-US" smtClean="0"/>
+              <a:rPr lang="en-US"/>
               <a:t>Click to edit Master title style</a:t>
             </a:r>
             <a:endParaRPr lang="en-US" dirty="0"/>
@@ -1130,35 +1131,35 @@
           <a:p>
             <a:pPr lvl="0"/>
             <a:r>
-              <a:rPr lang="en-US" smtClean="0"/>
+              <a:rPr lang="en-US"/>
               <a:t>Edit Master text styles</a:t>
             </a:r>
           </a:p>
           <a:p>
             <a:pPr lvl="1"/>
             <a:r>
-              <a:rPr lang="en-US" smtClean="0"/>
+              <a:rPr lang="en-US"/>
               <a:t>Second level</a:t>
             </a:r>
           </a:p>
           <a:p>
             <a:pPr lvl="2"/>
             <a:r>
-              <a:rPr lang="en-US" smtClean="0"/>
+              <a:rPr lang="en-US"/>
               <a:t>Third level</a:t>
             </a:r>
           </a:p>
           <a:p>
             <a:pPr lvl="3"/>
             <a:r>
-              <a:rPr lang="en-US" smtClean="0"/>
+              <a:rPr lang="en-US"/>
               <a:t>Fourth level</a:t>
             </a:r>
           </a:p>
           <a:p>
             <a:pPr lvl="4"/>
             <a:r>
-              <a:rPr lang="en-US" smtClean="0"/>
+              <a:rPr lang="en-US"/>
               <a:t>Fifth level</a:t>
             </a:r>
             <a:endParaRPr lang="en-US" dirty="0"/>
@@ -1187,35 +1188,35 @@
           <a:p>
             <a:pPr lvl="0"/>
             <a:r>
-              <a:rPr lang="en-US" smtClean="0"/>
+              <a:rPr lang="en-US"/>
               <a:t>Edit Master text styles</a:t>
             </a:r>
           </a:p>
           <a:p>
             <a:pPr lvl="1"/>
             <a:r>
-              <a:rPr lang="en-US" smtClean="0"/>
+              <a:rPr lang="en-US"/>
               <a:t>Second level</a:t>
             </a:r>
           </a:p>
           <a:p>
             <a:pPr lvl="2"/>
             <a:r>
-              <a:rPr lang="en-US" smtClean="0"/>
+              <a:rPr lang="en-US"/>
               <a:t>Third level</a:t>
             </a:r>
           </a:p>
           <a:p>
             <a:pPr lvl="3"/>
             <a:r>
-              <a:rPr lang="en-US" smtClean="0"/>
+              <a:rPr lang="en-US"/>
               <a:t>Fourth level</a:t>
             </a:r>
           </a:p>
           <a:p>
             <a:pPr lvl="4"/>
             <a:r>
-              <a:rPr lang="en-US" smtClean="0"/>
+              <a:rPr lang="en-US"/>
               <a:t>Fifth level</a:t>
             </a:r>
             <a:endParaRPr lang="en-US" dirty="0"/>
@@ -1239,7 +1240,7 @@
           <a:p>
             <a:fld id="{F3F0FDFC-A3F0-49EF-9F9E-7E3065794AD8}" type="datetimeFigureOut">
               <a:rPr lang="en-US" smtClean="0"/>
-              <a:t>3/27/2019</a:t>
+              <a:t>10/21/2019</a:t>
             </a:fld>
             <a:endParaRPr lang="en-US"/>
           </a:p>
@@ -1338,7 +1339,7 @@
           <a:lstStyle/>
           <a:p>
             <a:r>
-              <a:rPr lang="en-US" smtClean="0"/>
+              <a:rPr lang="en-US"/>
               <a:t>Click to edit Master title style</a:t>
             </a:r>
             <a:endParaRPr lang="en-US" dirty="0"/>
@@ -1404,7 +1405,7 @@
           <a:p>
             <a:pPr lvl="0"/>
             <a:r>
-              <a:rPr lang="en-US" smtClean="0"/>
+              <a:rPr lang="en-US"/>
               <a:t>Edit Master text styles</a:t>
             </a:r>
           </a:p>
@@ -1432,35 +1433,35 @@
           <a:p>
             <a:pPr lvl="0"/>
             <a:r>
-              <a:rPr lang="en-US" smtClean="0"/>
+              <a:rPr lang="en-US"/>
               <a:t>Edit Master text styles</a:t>
             </a:r>
           </a:p>
           <a:p>
             <a:pPr lvl="1"/>
             <a:r>
-              <a:rPr lang="en-US" smtClean="0"/>
+              <a:rPr lang="en-US"/>
               <a:t>Second level</a:t>
             </a:r>
           </a:p>
           <a:p>
             <a:pPr lvl="2"/>
             <a:r>
-              <a:rPr lang="en-US" smtClean="0"/>
+              <a:rPr lang="en-US"/>
               <a:t>Third level</a:t>
             </a:r>
           </a:p>
           <a:p>
             <a:pPr lvl="3"/>
             <a:r>
-              <a:rPr lang="en-US" smtClean="0"/>
+              <a:rPr lang="en-US"/>
               <a:t>Fourth level</a:t>
             </a:r>
           </a:p>
           <a:p>
             <a:pPr lvl="4"/>
             <a:r>
-              <a:rPr lang="en-US" smtClean="0"/>
+              <a:rPr lang="en-US"/>
               <a:t>Fifth level</a:t>
             </a:r>
             <a:endParaRPr lang="en-US" dirty="0"/>
@@ -1526,7 +1527,7 @@
           <a:p>
             <a:pPr lvl="0"/>
             <a:r>
-              <a:rPr lang="en-US" smtClean="0"/>
+              <a:rPr lang="en-US"/>
               <a:t>Edit Master text styles</a:t>
             </a:r>
           </a:p>
@@ -1554,35 +1555,35 @@
           <a:p>
             <a:pPr lvl="0"/>
             <a:r>
-              <a:rPr lang="en-US" smtClean="0"/>
+              <a:rPr lang="en-US"/>
               <a:t>Edit Master text styles</a:t>
             </a:r>
           </a:p>
           <a:p>
             <a:pPr lvl="1"/>
             <a:r>
-              <a:rPr lang="en-US" smtClean="0"/>
+              <a:rPr lang="en-US"/>
               <a:t>Second level</a:t>
             </a:r>
           </a:p>
           <a:p>
             <a:pPr lvl="2"/>
             <a:r>
-              <a:rPr lang="en-US" smtClean="0"/>
+              <a:rPr lang="en-US"/>
               <a:t>Third level</a:t>
             </a:r>
           </a:p>
           <a:p>
             <a:pPr lvl="3"/>
             <a:r>
-              <a:rPr lang="en-US" smtClean="0"/>
+              <a:rPr lang="en-US"/>
               <a:t>Fourth level</a:t>
             </a:r>
           </a:p>
           <a:p>
             <a:pPr lvl="4"/>
             <a:r>
-              <a:rPr lang="en-US" smtClean="0"/>
+              <a:rPr lang="en-US"/>
               <a:t>Fifth level</a:t>
             </a:r>
             <a:endParaRPr lang="en-US" dirty="0"/>
@@ -1606,7 +1607,7 @@
           <a:p>
             <a:fld id="{F3F0FDFC-A3F0-49EF-9F9E-7E3065794AD8}" type="datetimeFigureOut">
               <a:rPr lang="en-US" smtClean="0"/>
-              <a:t>3/27/2019</a:t>
+              <a:t>10/21/2019</a:t>
             </a:fld>
             <a:endParaRPr lang="en-US"/>
           </a:p>
@@ -1700,7 +1701,7 @@
           <a:lstStyle/>
           <a:p>
             <a:r>
-              <a:rPr lang="en-US" smtClean="0"/>
+              <a:rPr lang="en-US"/>
               <a:t>Click to edit Master title style</a:t>
             </a:r>
             <a:endParaRPr lang="en-US" dirty="0"/>
@@ -1724,7 +1725,7 @@
           <a:p>
             <a:fld id="{F3F0FDFC-A3F0-49EF-9F9E-7E3065794AD8}" type="datetimeFigureOut">
               <a:rPr lang="en-US" smtClean="0"/>
-              <a:t>3/27/2019</a:t>
+              <a:t>10/21/2019</a:t>
             </a:fld>
             <a:endParaRPr lang="en-US"/>
           </a:p>
@@ -1819,7 +1820,7 @@
           <a:p>
             <a:fld id="{F3F0FDFC-A3F0-49EF-9F9E-7E3065794AD8}" type="datetimeFigureOut">
               <a:rPr lang="en-US" smtClean="0"/>
-              <a:t>3/27/2019</a:t>
+              <a:t>10/21/2019</a:t>
             </a:fld>
             <a:endParaRPr lang="en-US"/>
           </a:p>
@@ -1922,7 +1923,7 @@
           </a:lstStyle>
           <a:p>
             <a:r>
-              <a:rPr lang="en-US" smtClean="0"/>
+              <a:rPr lang="en-US"/>
               <a:t>Click to edit Master title style</a:t>
             </a:r>
             <a:endParaRPr lang="en-US" dirty="0"/>
@@ -1979,35 +1980,35 @@
           <a:p>
             <a:pPr lvl="0"/>
             <a:r>
-              <a:rPr lang="en-US" smtClean="0"/>
+              <a:rPr lang="en-US"/>
               <a:t>Edit Master text styles</a:t>
             </a:r>
           </a:p>
           <a:p>
             <a:pPr lvl="1"/>
             <a:r>
-              <a:rPr lang="en-US" smtClean="0"/>
+              <a:rPr lang="en-US"/>
               <a:t>Second level</a:t>
             </a:r>
           </a:p>
           <a:p>
             <a:pPr lvl="2"/>
             <a:r>
-              <a:rPr lang="en-US" smtClean="0"/>
+              <a:rPr lang="en-US"/>
               <a:t>Third level</a:t>
             </a:r>
           </a:p>
           <a:p>
             <a:pPr lvl="3"/>
             <a:r>
-              <a:rPr lang="en-US" smtClean="0"/>
+              <a:rPr lang="en-US"/>
               <a:t>Fourth level</a:t>
             </a:r>
           </a:p>
           <a:p>
             <a:pPr lvl="4"/>
             <a:r>
-              <a:rPr lang="en-US" smtClean="0"/>
+              <a:rPr lang="en-US"/>
               <a:t>Fifth level</a:t>
             </a:r>
             <a:endParaRPr lang="en-US" dirty="0"/>
@@ -2073,7 +2074,7 @@
           <a:p>
             <a:pPr lvl="0"/>
             <a:r>
-              <a:rPr lang="en-US" smtClean="0"/>
+              <a:rPr lang="en-US"/>
               <a:t>Edit Master text styles</a:t>
             </a:r>
           </a:p>
@@ -2096,7 +2097,7 @@
           <a:p>
             <a:fld id="{F3F0FDFC-A3F0-49EF-9F9E-7E3065794AD8}" type="datetimeFigureOut">
               <a:rPr lang="en-US" smtClean="0"/>
-              <a:t>3/27/2019</a:t>
+              <a:t>10/21/2019</a:t>
             </a:fld>
             <a:endParaRPr lang="en-US"/>
           </a:p>
@@ -2199,7 +2200,7 @@
           </a:lstStyle>
           <a:p>
             <a:r>
-              <a:rPr lang="en-US" smtClean="0"/>
+              <a:rPr lang="en-US"/>
               <a:t>Click to edit Master title style</a:t>
             </a:r>
             <a:endParaRPr lang="en-US" dirty="0"/>
@@ -2264,7 +2265,7 @@
           </a:lstStyle>
           <a:p>
             <a:r>
-              <a:rPr lang="en-US" smtClean="0"/>
+              <a:rPr lang="en-US"/>
               <a:t>Click icon to add picture</a:t>
             </a:r>
             <a:endParaRPr lang="en-US" dirty="0"/>
@@ -2330,7 +2331,7 @@
           <a:p>
             <a:pPr lvl="0"/>
             <a:r>
-              <a:rPr lang="en-US" smtClean="0"/>
+              <a:rPr lang="en-US"/>
               <a:t>Edit Master text styles</a:t>
             </a:r>
           </a:p>
@@ -2353,7 +2354,7 @@
           <a:p>
             <a:fld id="{F3F0FDFC-A3F0-49EF-9F9E-7E3065794AD8}" type="datetimeFigureOut">
               <a:rPr lang="en-US" smtClean="0"/>
-              <a:t>3/27/2019</a:t>
+              <a:t>10/21/2019</a:t>
             </a:fld>
             <a:endParaRPr lang="en-US"/>
           </a:p>
@@ -2462,7 +2463,7 @@
           <a:lstStyle/>
           <a:p>
             <a:r>
-              <a:rPr lang="en-US" smtClean="0"/>
+              <a:rPr lang="en-US"/>
               <a:t>Click to edit Master title style</a:t>
             </a:r>
             <a:endParaRPr lang="en-US" dirty="0"/>
@@ -2496,35 +2497,35 @@
           <a:p>
             <a:pPr lvl="0"/>
             <a:r>
-              <a:rPr lang="en-US" smtClean="0"/>
+              <a:rPr lang="en-US"/>
               <a:t>Edit Master text styles</a:t>
             </a:r>
           </a:p>
           <a:p>
             <a:pPr lvl="1"/>
             <a:r>
-              <a:rPr lang="en-US" smtClean="0"/>
+              <a:rPr lang="en-US"/>
               <a:t>Second level</a:t>
             </a:r>
           </a:p>
           <a:p>
             <a:pPr lvl="2"/>
             <a:r>
-              <a:rPr lang="en-US" smtClean="0"/>
+              <a:rPr lang="en-US"/>
               <a:t>Third level</a:t>
             </a:r>
           </a:p>
           <a:p>
             <a:pPr lvl="3"/>
             <a:r>
-              <a:rPr lang="en-US" smtClean="0"/>
+              <a:rPr lang="en-US"/>
               <a:t>Fourth level</a:t>
             </a:r>
           </a:p>
           <a:p>
             <a:pPr lvl="4"/>
             <a:r>
-              <a:rPr lang="en-US" smtClean="0"/>
+              <a:rPr lang="en-US"/>
               <a:t>Fifth level</a:t>
             </a:r>
             <a:endParaRPr lang="en-US" dirty="0"/>
@@ -2566,7 +2567,7 @@
           <a:p>
             <a:fld id="{F3F0FDFC-A3F0-49EF-9F9E-7E3065794AD8}" type="datetimeFigureOut">
               <a:rPr lang="en-US" smtClean="0"/>
-              <a:t>3/27/2019</a:t>
+              <a:t>10/21/2019</a:t>
             </a:fld>
             <a:endParaRPr lang="en-US"/>
           </a:p>
@@ -7950,7 +7951,7 @@
               </a:spcAft>
             </a:pPr>
             <a:r>
-              <a:rPr lang="en-US" sz="1050" b="1" dirty="0" smtClean="0"/>
+              <a:rPr lang="en-US" sz="1050" b="1" dirty="0"/>
               <a:t>Geologic scenario:</a:t>
             </a:r>
           </a:p>
@@ -7961,40 +7962,16 @@
               </a:spcAft>
             </a:pPr>
             <a:r>
-              <a:rPr lang="en-US" sz="1000" dirty="0" smtClean="0"/>
-              <a:t>Early </a:t>
+              <a:rPr lang="en-US" sz="1000" dirty="0"/>
+              <a:t>Early Proterozoic metamorphic rocks are overlain </a:t>
+            </a:r>
+            <a:r>
+              <a:rPr lang="en-US" sz="1000" dirty="0" err="1"/>
+              <a:t>unconformably</a:t>
             </a:r>
             <a:r>
               <a:rPr lang="en-US" sz="1000" dirty="0"/>
-              <a:t>Proterozoic metamorphic </a:t>
-            </a:r>
-            <a:r>
-              <a:rPr lang="en-US" sz="1000" dirty="0" smtClean="0"/>
-              <a:t>rocks are overlain </a:t>
-            </a:r>
-            <a:r>
-              <a:rPr lang="en-US" sz="1000" dirty="0" err="1" smtClean="0"/>
-              <a:t>unconformably</a:t>
-            </a:r>
-            <a:r>
-              <a:rPr lang="en-US" sz="1000" dirty="0" smtClean="0"/>
-              <a:t> by a Cambrian thru Silurian stratigraphic package; Sometime between Silurian and Jurassic, the sequence was tilted and eroded to a near flat surface, on which  </a:t>
-            </a:r>
-            <a:r>
-              <a:rPr lang="en-US" sz="1000" dirty="0"/>
-              <a:t>a Jurassic age sedimentary </a:t>
-            </a:r>
-            <a:r>
-              <a:rPr lang="en-US" sz="1000" dirty="0" smtClean="0"/>
-              <a:t>unit was deposited. That unit </a:t>
-            </a:r>
-            <a:r>
-              <a:rPr lang="en-US" sz="1000" dirty="0"/>
-              <a:t>has a lower clastic part with an internal tuff marker bed, and an upper limestone </a:t>
-            </a:r>
-            <a:r>
-              <a:rPr lang="en-US" sz="1000" dirty="0" smtClean="0"/>
-              <a:t>part; these are not differentiated on the map, but are described as parts of the unit. </a:t>
+              <a:t> by a Cambrian thru Silurian stratigraphic package; Sometime between Silurian and Jurassic, the sequence was tilted and eroded to a near flat surface, on which  a Jurassic age sedimentary unit was deposited. That unit has a lower clastic part with an internal tuff marker bed, and an upper limestone part; these are not differentiated on the map, but are described as parts of the unit. </a:t>
             </a:r>
           </a:p>
           <a:p>
@@ -8004,39 +7981,15 @@
               </a:spcAft>
             </a:pPr>
             <a:r>
-              <a:rPr lang="en-US" sz="1000" dirty="0" smtClean="0"/>
-              <a:t>The Jurassic and older rocks are </a:t>
+              <a:rPr lang="en-US" sz="1000" dirty="0"/>
+              <a:t>The Jurassic and older rocks are intruded by a Cretaceous granite, and by a Cretaceous diorite dike that also intrudes the Cretaceous granite. A contact metamorphic aureole formed around the Cretaceous granite. The pluton contains extensive internal </a:t>
+            </a:r>
+            <a:r>
+              <a:rPr lang="en-US" sz="1000" dirty="0" err="1"/>
+              <a:t>schlieren</a:t>
             </a:r>
             <a:r>
               <a:rPr lang="en-US" sz="1000" dirty="0"/>
-              <a:t>intruded by a Cretaceous granite, and </a:t>
-            </a:r>
-            <a:r>
-              <a:rPr lang="en-US" sz="1000" dirty="0" smtClean="0"/>
-              <a:t>by </a:t>
-            </a:r>
-            <a:r>
-              <a:rPr lang="en-US" sz="1000" dirty="0"/>
-              <a:t>a Cretaceous diorite </a:t>
-            </a:r>
-            <a:r>
-              <a:rPr lang="en-US" sz="1000" dirty="0" smtClean="0"/>
-              <a:t>dike</a:t>
-            </a:r>
-            <a:r>
-              <a:rPr lang="en-US" sz="1000" dirty="0"/>
-              <a:t> </a:t>
-            </a:r>
-            <a:r>
-              <a:rPr lang="en-US" sz="1000" dirty="0" smtClean="0"/>
-              <a:t>that also intrudes the Cretaceous granite. A contact metamorphic aureole formed around the Cretaceous granite. The pluton contains extensive internal </a:t>
-            </a:r>
-            <a:r>
-              <a:rPr lang="en-US" sz="1000" dirty="0" err="1" smtClean="0"/>
-              <a:t>schlieren</a:t>
-            </a:r>
-            <a:r>
-              <a:rPr lang="en-US" sz="1000" dirty="0" smtClean="0"/>
               <a:t> surfaces with concentrations of mafic minerals.</a:t>
             </a:r>
           </a:p>
@@ -8047,26 +8000,25 @@
               </a:spcAft>
             </a:pPr>
             <a:r>
-              <a:rPr lang="en-US" sz="1000" dirty="0" smtClean="0"/>
+              <a:rPr lang="en-US" sz="1000" dirty="0"/>
               <a:t>Another period of </a:t>
             </a:r>
             <a:r>
-              <a:rPr lang="en-US" sz="1000" dirty="0" err="1" smtClean="0"/>
+              <a:rPr lang="en-US" sz="1000" dirty="0" err="1"/>
               <a:t>exumation</a:t>
             </a:r>
             <a:r>
-              <a:rPr lang="en-US" sz="1000" dirty="0" smtClean="0"/>
+              <a:rPr lang="en-US" sz="1000" dirty="0"/>
               <a:t> and erosion removed the units that overlay the Jurassic sedimentary unit when the granite was intruded, producing an erosion surface on the Jurassic sedimentary unit </a:t>
             </a:r>
             <a:r>
-              <a:rPr lang="en-US" sz="1000" smtClean="0"/>
+              <a:rPr lang="en-US" sz="1000"/>
               <a:t>and Cretaceous </a:t>
             </a:r>
             <a:r>
-              <a:rPr lang="en-US" sz="1000" dirty="0" smtClean="0"/>
+              <a:rPr lang="en-US" sz="1000" dirty="0"/>
               <a:t>igneous rocks. Late Miocene sediment buried this surface, and after a period of non deposition in the Pliocene and Pleistocene, Holocene sediment blanketed the Miocene sediment.</a:t>
             </a:r>
-            <a:endParaRPr lang="en-US" sz="1000" dirty="0"/>
           </a:p>
         </p:txBody>
       </p:sp>
@@ -8074,6 +8026,376 @@
     <p:extLst>
       <p:ext uri="{BB962C8B-B14F-4D97-AF65-F5344CB8AC3E}">
         <p14:creationId xmlns:p14="http://schemas.microsoft.com/office/powerpoint/2010/main" val="3918357337"/>
+      </p:ext>
+    </p:extLst>
+  </p:cSld>
+  <p:clrMapOvr>
+    <a:masterClrMapping/>
+  </p:clrMapOvr>
+</p:sld>
+</file>
+
+<file path=ppt/slides/slide2.xml><?xml version="1.0" encoding="utf-8"?>
+<p:sld xmlns:a="http://schemas.openxmlformats.org/drawingml/2006/main" xmlns:r="http://schemas.openxmlformats.org/officeDocument/2006/relationships" xmlns:p="http://schemas.openxmlformats.org/presentationml/2006/main">
+  <p:cSld>
+    <p:spTree>
+      <p:nvGrpSpPr>
+        <p:cNvPr id="1" name=""/>
+        <p:cNvGrpSpPr/>
+        <p:nvPr/>
+      </p:nvGrpSpPr>
+      <p:grpSpPr>
+        <a:xfrm>
+          <a:off x="0" y="0"/>
+          <a:ext cx="0" cy="0"/>
+          <a:chOff x="0" y="0"/>
+          <a:chExt cx="0" cy="0"/>
+        </a:xfrm>
+      </p:grpSpPr>
+      <p:pic>
+        <p:nvPicPr>
+          <p:cNvPr id="5" name="Picture 4" descr="A close up of a logo&#10;&#10;Description automatically generated">
+            <a:extLst>
+              <a:ext uri="{FF2B5EF4-FFF2-40B4-BE49-F238E27FC236}">
+                <a16:creationId xmlns:a16="http://schemas.microsoft.com/office/drawing/2014/main" id="{2862D8B4-D14B-4DC4-89A5-78DA9C974742}"/>
+              </a:ext>
+            </a:extLst>
+          </p:cNvPr>
+          <p:cNvPicPr>
+            <a:picLocks noChangeAspect="1"/>
+          </p:cNvPicPr>
+          <p:nvPr/>
+        </p:nvPicPr>
+        <p:blipFill>
+          <a:blip r:embed="rId2">
+            <a:extLst>
+              <a:ext uri="{28A0092B-C50C-407E-A947-70E740481C1C}">
+                <a14:useLocalDpi xmlns:a14="http://schemas.microsoft.com/office/drawing/2010/main" val="0"/>
+              </a:ext>
+            </a:extLst>
+          </a:blip>
+          <a:stretch>
+            <a:fillRect/>
+          </a:stretch>
+        </p:blipFill>
+        <p:spPr>
+          <a:xfrm>
+            <a:off x="0" y="2084440"/>
+            <a:ext cx="10058400" cy="2689120"/>
+          </a:xfrm>
+          <a:prstGeom prst="rect">
+            <a:avLst/>
+          </a:prstGeom>
+        </p:spPr>
+      </p:pic>
+      <p:sp>
+        <p:nvSpPr>
+          <p:cNvPr id="6" name="TextBox 5">
+            <a:extLst>
+              <a:ext uri="{FF2B5EF4-FFF2-40B4-BE49-F238E27FC236}">
+                <a16:creationId xmlns:a16="http://schemas.microsoft.com/office/drawing/2014/main" id="{30FDBD11-C597-4CE7-B23F-7C598CD33DF8}"/>
+              </a:ext>
+            </a:extLst>
+          </p:cNvPr>
+          <p:cNvSpPr txBox="1"/>
+          <p:nvPr/>
+        </p:nvSpPr>
+        <p:spPr>
+          <a:xfrm>
+            <a:off x="5826642" y="4731488"/>
+            <a:ext cx="407484" cy="369332"/>
+          </a:xfrm>
+          <a:prstGeom prst="rect">
+            <a:avLst/>
+          </a:prstGeom>
+          <a:noFill/>
+        </p:spPr>
+        <p:txBody>
+          <a:bodyPr wrap="none" rtlCol="0">
+            <a:spAutoFit/>
+          </a:bodyPr>
+          <a:lstStyle/>
+          <a:p>
+            <a:r>
+              <a:rPr lang="en-US" dirty="0"/>
+              <a:t>F1</a:t>
+            </a:r>
+          </a:p>
+        </p:txBody>
+      </p:sp>
+      <p:sp>
+        <p:nvSpPr>
+          <p:cNvPr id="7" name="TextBox 6">
+            <a:extLst>
+              <a:ext uri="{FF2B5EF4-FFF2-40B4-BE49-F238E27FC236}">
+                <a16:creationId xmlns:a16="http://schemas.microsoft.com/office/drawing/2014/main" id="{B892633B-76C5-4792-B5BC-0531E2F581AB}"/>
+              </a:ext>
+            </a:extLst>
+          </p:cNvPr>
+          <p:cNvSpPr txBox="1"/>
+          <p:nvPr/>
+        </p:nvSpPr>
+        <p:spPr>
+          <a:xfrm>
+            <a:off x="4621716" y="3244334"/>
+            <a:ext cx="407484" cy="369332"/>
+          </a:xfrm>
+          <a:prstGeom prst="rect">
+            <a:avLst/>
+          </a:prstGeom>
+          <a:noFill/>
+        </p:spPr>
+        <p:txBody>
+          <a:bodyPr wrap="none" rtlCol="0">
+            <a:spAutoFit/>
+          </a:bodyPr>
+          <a:lstStyle/>
+          <a:p>
+            <a:r>
+              <a:rPr lang="en-US" dirty="0">
+                <a:highlight>
+                  <a:srgbClr val="FFFF00"/>
+                </a:highlight>
+              </a:rPr>
+              <a:t>F2</a:t>
+            </a:r>
+          </a:p>
+        </p:txBody>
+      </p:sp>
+      <p:sp>
+        <p:nvSpPr>
+          <p:cNvPr id="8" name="TextBox 7">
+            <a:extLst>
+              <a:ext uri="{FF2B5EF4-FFF2-40B4-BE49-F238E27FC236}">
+                <a16:creationId xmlns:a16="http://schemas.microsoft.com/office/drawing/2014/main" id="{EF09DF73-95CE-450F-BD59-C321CE9BDD4E}"/>
+              </a:ext>
+            </a:extLst>
+          </p:cNvPr>
+          <p:cNvSpPr txBox="1"/>
+          <p:nvPr/>
+        </p:nvSpPr>
+        <p:spPr>
+          <a:xfrm>
+            <a:off x="5231316" y="3886658"/>
+            <a:ext cx="407484" cy="369332"/>
+          </a:xfrm>
+          <a:prstGeom prst="rect">
+            <a:avLst/>
+          </a:prstGeom>
+          <a:noFill/>
+        </p:spPr>
+        <p:txBody>
+          <a:bodyPr wrap="none" rtlCol="0">
+            <a:spAutoFit/>
+          </a:bodyPr>
+          <a:lstStyle/>
+          <a:p>
+            <a:r>
+              <a:rPr lang="en-US" dirty="0">
+                <a:highlight>
+                  <a:srgbClr val="FFFF00"/>
+                </a:highlight>
+              </a:rPr>
+              <a:t>F3</a:t>
+            </a:r>
+          </a:p>
+        </p:txBody>
+      </p:sp>
+      <p:sp>
+        <p:nvSpPr>
+          <p:cNvPr id="9" name="TextBox 8">
+            <a:extLst>
+              <a:ext uri="{FF2B5EF4-FFF2-40B4-BE49-F238E27FC236}">
+                <a16:creationId xmlns:a16="http://schemas.microsoft.com/office/drawing/2014/main" id="{6B4DBC81-2469-4E9D-BEA1-0187C5AC32A5}"/>
+              </a:ext>
+            </a:extLst>
+          </p:cNvPr>
+          <p:cNvSpPr txBox="1"/>
+          <p:nvPr/>
+        </p:nvSpPr>
+        <p:spPr>
+          <a:xfrm>
+            <a:off x="8989877" y="2684352"/>
+            <a:ext cx="407484" cy="369332"/>
+          </a:xfrm>
+          <a:prstGeom prst="rect">
+            <a:avLst/>
+          </a:prstGeom>
+          <a:noFill/>
+        </p:spPr>
+        <p:txBody>
+          <a:bodyPr wrap="none" rtlCol="0">
+            <a:spAutoFit/>
+          </a:bodyPr>
+          <a:lstStyle/>
+          <a:p>
+            <a:r>
+              <a:rPr lang="en-US" dirty="0">
+                <a:highlight>
+                  <a:srgbClr val="FFFF00"/>
+                </a:highlight>
+              </a:rPr>
+              <a:t>F4</a:t>
+            </a:r>
+          </a:p>
+        </p:txBody>
+      </p:sp>
+      <p:sp>
+        <p:nvSpPr>
+          <p:cNvPr id="10" name="TextBox 9">
+            <a:extLst>
+              <a:ext uri="{FF2B5EF4-FFF2-40B4-BE49-F238E27FC236}">
+                <a16:creationId xmlns:a16="http://schemas.microsoft.com/office/drawing/2014/main" id="{FA796C7E-9428-4436-9E45-63B9E017C754}"/>
+              </a:ext>
+            </a:extLst>
+          </p:cNvPr>
+          <p:cNvSpPr txBox="1"/>
+          <p:nvPr/>
+        </p:nvSpPr>
+        <p:spPr>
+          <a:xfrm>
+            <a:off x="864781" y="2315020"/>
+            <a:ext cx="582211" cy="369332"/>
+          </a:xfrm>
+          <a:prstGeom prst="rect">
+            <a:avLst/>
+          </a:prstGeom>
+          <a:noFill/>
+        </p:spPr>
+        <p:txBody>
+          <a:bodyPr wrap="none" rtlCol="0">
+            <a:spAutoFit/>
+          </a:bodyPr>
+          <a:lstStyle/>
+          <a:p>
+            <a:r>
+              <a:rPr lang="en-US" dirty="0">
+                <a:highlight>
+                  <a:srgbClr val="FFFF00"/>
+                </a:highlight>
+              </a:rPr>
+              <a:t>F1.2</a:t>
+            </a:r>
+          </a:p>
+        </p:txBody>
+      </p:sp>
+      <p:sp>
+        <p:nvSpPr>
+          <p:cNvPr id="11" name="TextBox 10">
+            <a:extLst>
+              <a:ext uri="{FF2B5EF4-FFF2-40B4-BE49-F238E27FC236}">
+                <a16:creationId xmlns:a16="http://schemas.microsoft.com/office/drawing/2014/main" id="{8CCAD894-F5D2-472F-8492-1A99A61E1CB2}"/>
+              </a:ext>
+            </a:extLst>
+          </p:cNvPr>
+          <p:cNvSpPr txBox="1"/>
+          <p:nvPr/>
+        </p:nvSpPr>
+        <p:spPr>
+          <a:xfrm>
+            <a:off x="3760382" y="4071324"/>
+            <a:ext cx="582211" cy="369332"/>
+          </a:xfrm>
+          <a:prstGeom prst="rect">
+            <a:avLst/>
+          </a:prstGeom>
+          <a:noFill/>
+        </p:spPr>
+        <p:txBody>
+          <a:bodyPr wrap="none" rtlCol="0">
+            <a:spAutoFit/>
+          </a:bodyPr>
+          <a:lstStyle/>
+          <a:p>
+            <a:r>
+              <a:rPr lang="en-US" dirty="0">
+                <a:highlight>
+                  <a:srgbClr val="FFFF00"/>
+                </a:highlight>
+              </a:rPr>
+              <a:t>F1.1</a:t>
+            </a:r>
+          </a:p>
+        </p:txBody>
+      </p:sp>
+      <p:sp>
+        <p:nvSpPr>
+          <p:cNvPr id="12" name="TextBox 11">
+            <a:extLst>
+              <a:ext uri="{FF2B5EF4-FFF2-40B4-BE49-F238E27FC236}">
+                <a16:creationId xmlns:a16="http://schemas.microsoft.com/office/drawing/2014/main" id="{ABD8D020-0DBE-40EB-B602-0757105385C6}"/>
+              </a:ext>
+            </a:extLst>
+          </p:cNvPr>
+          <p:cNvSpPr txBox="1"/>
+          <p:nvPr/>
+        </p:nvSpPr>
+        <p:spPr>
+          <a:xfrm>
+            <a:off x="1727791" y="4090816"/>
+            <a:ext cx="407484" cy="369332"/>
+          </a:xfrm>
+          <a:prstGeom prst="rect">
+            <a:avLst/>
+          </a:prstGeom>
+          <a:noFill/>
+        </p:spPr>
+        <p:txBody>
+          <a:bodyPr wrap="none" rtlCol="0">
+            <a:spAutoFit/>
+          </a:bodyPr>
+          <a:lstStyle/>
+          <a:p>
+            <a:r>
+              <a:rPr lang="en-US" dirty="0">
+                <a:highlight>
+                  <a:srgbClr val="FFFF00"/>
+                </a:highlight>
+              </a:rPr>
+              <a:t>F5</a:t>
+            </a:r>
+          </a:p>
+        </p:txBody>
+      </p:sp>
+      <p:sp>
+        <p:nvSpPr>
+          <p:cNvPr id="13" name="TextBox 12">
+            <a:extLst>
+              <a:ext uri="{FF2B5EF4-FFF2-40B4-BE49-F238E27FC236}">
+                <a16:creationId xmlns:a16="http://schemas.microsoft.com/office/drawing/2014/main" id="{CFA9E7C7-45F0-478B-81F2-B2C0C1E8D827}"/>
+              </a:ext>
+            </a:extLst>
+          </p:cNvPr>
+          <p:cNvSpPr txBox="1"/>
+          <p:nvPr/>
+        </p:nvSpPr>
+        <p:spPr>
+          <a:xfrm>
+            <a:off x="2838893" y="5613991"/>
+            <a:ext cx="2637517" cy="369332"/>
+          </a:xfrm>
+          <a:prstGeom prst="rect">
+            <a:avLst/>
+          </a:prstGeom>
+          <a:noFill/>
+        </p:spPr>
+        <p:txBody>
+          <a:bodyPr wrap="none" rtlCol="0">
+            <a:spAutoFit/>
+          </a:bodyPr>
+          <a:lstStyle/>
+          <a:p>
+            <a:r>
+              <a:rPr lang="en-US" dirty="0"/>
+              <a:t>Eastern Rincon Mountains</a:t>
+            </a:r>
+          </a:p>
+        </p:txBody>
+      </p:sp>
+    </p:spTree>
+    <p:extLst>
+      <p:ext uri="{BB962C8B-B14F-4D97-AF65-F5344CB8AC3E}">
+        <p14:creationId xmlns:p14="http://schemas.microsoft.com/office/powerpoint/2010/main" val="2907901009"/>
       </p:ext>
     </p:extLst>
   </p:cSld>

</xml_diff>

<commit_message>
Add cross section with faults for new example instances
</commit_message>
<xml_diff>
--- a/TestInstances/GeologyScenarioForTesting.pptx
+++ b/TestInstances/GeologyScenarioForTesting.pptx
@@ -244,7 +244,7 @@
           <a:p>
             <a:fld id="{F3F0FDFC-A3F0-49EF-9F9E-7E3065794AD8}" type="datetimeFigureOut">
               <a:rPr lang="en-US" smtClean="0"/>
-              <a:t>10/21/2019</a:t>
+              <a:t>11/4/2019</a:t>
             </a:fld>
             <a:endParaRPr lang="en-US"/>
           </a:p>
@@ -414,7 +414,7 @@
           <a:p>
             <a:fld id="{F3F0FDFC-A3F0-49EF-9F9E-7E3065794AD8}" type="datetimeFigureOut">
               <a:rPr lang="en-US" smtClean="0"/>
-              <a:t>10/21/2019</a:t>
+              <a:t>11/4/2019</a:t>
             </a:fld>
             <a:endParaRPr lang="en-US"/>
           </a:p>
@@ -594,7 +594,7 @@
           <a:p>
             <a:fld id="{F3F0FDFC-A3F0-49EF-9F9E-7E3065794AD8}" type="datetimeFigureOut">
               <a:rPr lang="en-US" smtClean="0"/>
-              <a:t>10/21/2019</a:t>
+              <a:t>11/4/2019</a:t>
             </a:fld>
             <a:endParaRPr lang="en-US"/>
           </a:p>
@@ -764,7 +764,7 @@
           <a:p>
             <a:fld id="{F3F0FDFC-A3F0-49EF-9F9E-7E3065794AD8}" type="datetimeFigureOut">
               <a:rPr lang="en-US" smtClean="0"/>
-              <a:t>10/21/2019</a:t>
+              <a:t>11/4/2019</a:t>
             </a:fld>
             <a:endParaRPr lang="en-US"/>
           </a:p>
@@ -1008,7 +1008,7 @@
           <a:p>
             <a:fld id="{F3F0FDFC-A3F0-49EF-9F9E-7E3065794AD8}" type="datetimeFigureOut">
               <a:rPr lang="en-US" smtClean="0"/>
-              <a:t>10/21/2019</a:t>
+              <a:t>11/4/2019</a:t>
             </a:fld>
             <a:endParaRPr lang="en-US"/>
           </a:p>
@@ -1240,7 +1240,7 @@
           <a:p>
             <a:fld id="{F3F0FDFC-A3F0-49EF-9F9E-7E3065794AD8}" type="datetimeFigureOut">
               <a:rPr lang="en-US" smtClean="0"/>
-              <a:t>10/21/2019</a:t>
+              <a:t>11/4/2019</a:t>
             </a:fld>
             <a:endParaRPr lang="en-US"/>
           </a:p>
@@ -1607,7 +1607,7 @@
           <a:p>
             <a:fld id="{F3F0FDFC-A3F0-49EF-9F9E-7E3065794AD8}" type="datetimeFigureOut">
               <a:rPr lang="en-US" smtClean="0"/>
-              <a:t>10/21/2019</a:t>
+              <a:t>11/4/2019</a:t>
             </a:fld>
             <a:endParaRPr lang="en-US"/>
           </a:p>
@@ -1725,7 +1725,7 @@
           <a:p>
             <a:fld id="{F3F0FDFC-A3F0-49EF-9F9E-7E3065794AD8}" type="datetimeFigureOut">
               <a:rPr lang="en-US" smtClean="0"/>
-              <a:t>10/21/2019</a:t>
+              <a:t>11/4/2019</a:t>
             </a:fld>
             <a:endParaRPr lang="en-US"/>
           </a:p>
@@ -1820,7 +1820,7 @@
           <a:p>
             <a:fld id="{F3F0FDFC-A3F0-49EF-9F9E-7E3065794AD8}" type="datetimeFigureOut">
               <a:rPr lang="en-US" smtClean="0"/>
-              <a:t>10/21/2019</a:t>
+              <a:t>11/4/2019</a:t>
             </a:fld>
             <a:endParaRPr lang="en-US"/>
           </a:p>
@@ -2097,7 +2097,7 @@
           <a:p>
             <a:fld id="{F3F0FDFC-A3F0-49EF-9F9E-7E3065794AD8}" type="datetimeFigureOut">
               <a:rPr lang="en-US" smtClean="0"/>
-              <a:t>10/21/2019</a:t>
+              <a:t>11/4/2019</a:t>
             </a:fld>
             <a:endParaRPr lang="en-US"/>
           </a:p>
@@ -2354,7 +2354,7 @@
           <a:p>
             <a:fld id="{F3F0FDFC-A3F0-49EF-9F9E-7E3065794AD8}" type="datetimeFigureOut">
               <a:rPr lang="en-US" smtClean="0"/>
-              <a:t>10/21/2019</a:t>
+              <a:t>11/4/2019</a:t>
             </a:fld>
             <a:endParaRPr lang="en-US"/>
           </a:p>
@@ -2567,7 +2567,7 @@
           <a:p>
             <a:fld id="{F3F0FDFC-A3F0-49EF-9F9E-7E3065794AD8}" type="datetimeFigureOut">
               <a:rPr lang="en-US" smtClean="0"/>
-              <a:t>10/21/2019</a:t>
+              <a:t>11/4/2019</a:t>
             </a:fld>
             <a:endParaRPr lang="en-US"/>
           </a:p>
@@ -8157,7 +8157,7 @@
                   <a:srgbClr val="FFFF00"/>
                 </a:highlight>
               </a:rPr>
-              <a:t>F2</a:t>
+              <a:t>F1</a:t>
             </a:r>
           </a:p>
         </p:txBody>
@@ -8274,7 +8274,7 @@
                   <a:srgbClr val="FFFF00"/>
                 </a:highlight>
               </a:rPr>
-              <a:t>F1.2</a:t>
+              <a:t>F2.2</a:t>
             </a:r>
           </a:p>
         </p:txBody>
@@ -8313,7 +8313,7 @@
                   <a:srgbClr val="FFFF00"/>
                 </a:highlight>
               </a:rPr>
-              <a:t>F1.1</a:t>
+              <a:t>F2.1</a:t>
             </a:r>
           </a:p>
         </p:txBody>
@@ -8388,6 +8388,313 @@
             <a:r>
               <a:rPr lang="en-US" dirty="0"/>
               <a:t>Eastern Rincon Mountains</a:t>
+            </a:r>
+          </a:p>
+        </p:txBody>
+      </p:sp>
+      <p:sp>
+        <p:nvSpPr>
+          <p:cNvPr id="2" name="TextBox 1">
+            <a:extLst>
+              <a:ext uri="{FF2B5EF4-FFF2-40B4-BE49-F238E27FC236}">
+                <a16:creationId xmlns:a16="http://schemas.microsoft.com/office/drawing/2014/main" id="{CDC848FE-16B2-4C17-BBDE-FEA08541C8BA}"/>
+              </a:ext>
+            </a:extLst>
+          </p:cNvPr>
+          <p:cNvSpPr txBox="1"/>
+          <p:nvPr/>
+        </p:nvSpPr>
+        <p:spPr>
+          <a:xfrm>
+            <a:off x="1636889" y="304800"/>
+            <a:ext cx="7406258" cy="1600438"/>
+          </a:xfrm>
+          <a:prstGeom prst="rect">
+            <a:avLst/>
+          </a:prstGeom>
+          <a:noFill/>
+        </p:spPr>
+        <p:txBody>
+          <a:bodyPr wrap="none" rtlCol="0">
+            <a:spAutoFit/>
+          </a:bodyPr>
+          <a:lstStyle/>
+          <a:p>
+            <a:r>
+              <a:rPr lang="en-US" sz="1400" dirty="0"/>
+              <a:t>Events:</a:t>
+            </a:r>
+          </a:p>
+          <a:p>
+            <a:r>
+              <a:rPr lang="en-US" sz="1400" dirty="0"/>
+              <a:t>Proterozoic intrusion</a:t>
+            </a:r>
+          </a:p>
+          <a:p>
+            <a:r>
+              <a:rPr lang="en-US" sz="1400" dirty="0"/>
+              <a:t>Paleozoic deposition</a:t>
+            </a:r>
+          </a:p>
+          <a:p>
+            <a:r>
+              <a:rPr lang="en-US" sz="1400" dirty="0"/>
+              <a:t>Mesozoic deposition</a:t>
+            </a:r>
+          </a:p>
+          <a:p>
+            <a:r>
+              <a:rPr lang="en-US" sz="1400" dirty="0"/>
+              <a:t>Thrust– </a:t>
+            </a:r>
+            <a:r>
+              <a:rPr lang="en-US" sz="1400" dirty="0" err="1"/>
+              <a:t>pC</a:t>
+            </a:r>
+            <a:r>
+              <a:rPr lang="en-US" sz="1400" dirty="0"/>
+              <a:t> on </a:t>
+            </a:r>
+            <a:r>
+              <a:rPr lang="en-US" sz="1400" dirty="0" err="1"/>
+              <a:t>Mz</a:t>
+            </a:r>
+            <a:r>
+              <a:rPr lang="en-US" sz="1400" dirty="0"/>
+              <a:t>, burial of Phanerozoic </a:t>
+            </a:r>
+            <a:r>
+              <a:rPr lang="en-US" sz="1400" dirty="0" err="1"/>
+              <a:t>supracrustals</a:t>
+            </a:r>
+            <a:r>
+              <a:rPr lang="en-US" sz="1400" dirty="0"/>
+              <a:t> (note—this might be inversion of JK basins…)</a:t>
+            </a:r>
+          </a:p>
+          <a:p>
+            <a:r>
+              <a:rPr lang="en-US" sz="1400" dirty="0"/>
+              <a:t>Shear along </a:t>
+            </a:r>
+            <a:r>
+              <a:rPr lang="en-US" sz="1400" dirty="0" err="1"/>
+              <a:t>Pz</a:t>
+            </a:r>
+            <a:r>
+              <a:rPr lang="en-US" sz="1400" dirty="0"/>
+              <a:t>- </a:t>
+            </a:r>
+            <a:r>
+              <a:rPr lang="en-US" sz="1400" dirty="0" err="1"/>
+              <a:t>pC</a:t>
+            </a:r>
+            <a:r>
+              <a:rPr lang="en-US" sz="1400" dirty="0"/>
+              <a:t> contact</a:t>
+            </a:r>
+          </a:p>
+          <a:p>
+            <a:r>
+              <a:rPr lang="en-US" sz="1400" dirty="0"/>
+              <a:t> </a:t>
+            </a:r>
+          </a:p>
+        </p:txBody>
+      </p:sp>
+      <p:sp>
+        <p:nvSpPr>
+          <p:cNvPr id="4" name="TextBox 3">
+            <a:extLst>
+              <a:ext uri="{FF2B5EF4-FFF2-40B4-BE49-F238E27FC236}">
+                <a16:creationId xmlns:a16="http://schemas.microsoft.com/office/drawing/2014/main" id="{88E48F9F-C10A-4EDB-984F-F48E21E958C3}"/>
+              </a:ext>
+            </a:extLst>
+          </p:cNvPr>
+          <p:cNvSpPr txBox="1"/>
+          <p:nvPr/>
+        </p:nvSpPr>
+        <p:spPr>
+          <a:xfrm>
+            <a:off x="7406321" y="1550392"/>
+            <a:ext cx="2481874" cy="523220"/>
+          </a:xfrm>
+          <a:prstGeom prst="rect">
+            <a:avLst/>
+          </a:prstGeom>
+          <a:noFill/>
+        </p:spPr>
+        <p:txBody>
+          <a:bodyPr wrap="square" rtlCol="0">
+            <a:spAutoFit/>
+          </a:bodyPr>
+          <a:lstStyle/>
+          <a:p>
+            <a:r>
+              <a:rPr lang="en-US" sz="1400" dirty="0"/>
+              <a:t>Shearing associated with thrusting or crustal extension</a:t>
+            </a:r>
+          </a:p>
+        </p:txBody>
+      </p:sp>
+      <p:sp>
+        <p:nvSpPr>
+          <p:cNvPr id="14" name="TextBox 13">
+            <a:extLst>
+              <a:ext uri="{FF2B5EF4-FFF2-40B4-BE49-F238E27FC236}">
+                <a16:creationId xmlns:a16="http://schemas.microsoft.com/office/drawing/2014/main" id="{D4E7ADEA-311E-46F9-A966-A26BDF980642}"/>
+              </a:ext>
+            </a:extLst>
+          </p:cNvPr>
+          <p:cNvSpPr txBox="1"/>
+          <p:nvPr/>
+        </p:nvSpPr>
+        <p:spPr>
+          <a:xfrm>
+            <a:off x="85658" y="1217457"/>
+            <a:ext cx="1595155" cy="738664"/>
+          </a:xfrm>
+          <a:prstGeom prst="rect">
+            <a:avLst/>
+          </a:prstGeom>
+          <a:noFill/>
+        </p:spPr>
+        <p:txBody>
+          <a:bodyPr wrap="square" rtlCol="0">
+            <a:spAutoFit/>
+          </a:bodyPr>
+          <a:lstStyle/>
+          <a:p>
+            <a:pPr algn="ctr"/>
+            <a:r>
+              <a:rPr lang="en-US" sz="1400" dirty="0"/>
+              <a:t>Ductile deformation in basement</a:t>
+            </a:r>
+          </a:p>
+        </p:txBody>
+      </p:sp>
+      <p:sp>
+        <p:nvSpPr>
+          <p:cNvPr id="15" name="TextBox 14">
+            <a:extLst>
+              <a:ext uri="{FF2B5EF4-FFF2-40B4-BE49-F238E27FC236}">
+                <a16:creationId xmlns:a16="http://schemas.microsoft.com/office/drawing/2014/main" id="{D3DE884C-C26E-4DAE-A7B8-55F045BCDF6C}"/>
+              </a:ext>
+            </a:extLst>
+          </p:cNvPr>
+          <p:cNvSpPr txBox="1"/>
+          <p:nvPr/>
+        </p:nvSpPr>
+        <p:spPr>
+          <a:xfrm>
+            <a:off x="1617500" y="1657664"/>
+            <a:ext cx="3668184" cy="523220"/>
+          </a:xfrm>
+          <a:prstGeom prst="rect">
+            <a:avLst/>
+          </a:prstGeom>
+          <a:noFill/>
+        </p:spPr>
+        <p:txBody>
+          <a:bodyPr wrap="none" rtlCol="0">
+            <a:spAutoFit/>
+          </a:bodyPr>
+          <a:lstStyle/>
+          <a:p>
+            <a:r>
+              <a:rPr lang="en-US" sz="1400" dirty="0"/>
+              <a:t>Tilting of </a:t>
+            </a:r>
+            <a:r>
+              <a:rPr lang="en-US" sz="1400" dirty="0" err="1"/>
+              <a:t>Mz</a:t>
+            </a:r>
+            <a:r>
+              <a:rPr lang="en-US" sz="1400" dirty="0"/>
+              <a:t> Orogenic complex</a:t>
+            </a:r>
+          </a:p>
+          <a:p>
+            <a:r>
+              <a:rPr lang="en-US" sz="1400" dirty="0"/>
+              <a:t>normal faulting and growth-fault sedimentation</a:t>
+            </a:r>
+          </a:p>
+        </p:txBody>
+      </p:sp>
+      <p:sp>
+        <p:nvSpPr>
+          <p:cNvPr id="16" name="TextBox 15">
+            <a:extLst>
+              <a:ext uri="{FF2B5EF4-FFF2-40B4-BE49-F238E27FC236}">
+                <a16:creationId xmlns:a16="http://schemas.microsoft.com/office/drawing/2014/main" id="{E1343340-826B-4435-92F5-0B033291763F}"/>
+              </a:ext>
+            </a:extLst>
+          </p:cNvPr>
+          <p:cNvSpPr txBox="1"/>
+          <p:nvPr/>
+        </p:nvSpPr>
+        <p:spPr>
+          <a:xfrm>
+            <a:off x="5348997" y="1704231"/>
+            <a:ext cx="1887120" cy="584775"/>
+          </a:xfrm>
+          <a:prstGeom prst="rect">
+            <a:avLst/>
+          </a:prstGeom>
+          <a:noFill/>
+        </p:spPr>
+        <p:txBody>
+          <a:bodyPr wrap="none" rtlCol="0">
+            <a:spAutoFit/>
+          </a:bodyPr>
+          <a:lstStyle/>
+          <a:p>
+            <a:r>
+              <a:rPr lang="en-US" sz="1600" dirty="0"/>
+              <a:t>Erosion</a:t>
+            </a:r>
+          </a:p>
+          <a:p>
+            <a:r>
+              <a:rPr lang="en-US" sz="1600" dirty="0"/>
+              <a:t>Detachment faulting</a:t>
+            </a:r>
+          </a:p>
+        </p:txBody>
+      </p:sp>
+      <p:sp>
+        <p:nvSpPr>
+          <p:cNvPr id="17" name="TextBox 16">
+            <a:extLst>
+              <a:ext uri="{FF2B5EF4-FFF2-40B4-BE49-F238E27FC236}">
+                <a16:creationId xmlns:a16="http://schemas.microsoft.com/office/drawing/2014/main" id="{C216E02E-22D9-4792-8AA5-ACD586AFB158}"/>
+              </a:ext>
+            </a:extLst>
+          </p:cNvPr>
+          <p:cNvSpPr txBox="1"/>
+          <p:nvPr/>
+        </p:nvSpPr>
+        <p:spPr>
+          <a:xfrm>
+            <a:off x="1680813" y="2222530"/>
+            <a:ext cx="2950295" cy="307777"/>
+          </a:xfrm>
+          <a:prstGeom prst="rect">
+            <a:avLst/>
+          </a:prstGeom>
+          <a:noFill/>
+        </p:spPr>
+        <p:txBody>
+          <a:bodyPr wrap="none" rtlCol="0">
+            <a:spAutoFit/>
+          </a:bodyPr>
+          <a:lstStyle/>
+          <a:p>
+            <a:r>
+              <a:rPr lang="en-US" sz="1400" dirty="0"/>
+              <a:t>Late-stage Down to east normal faults</a:t>
             </a:r>
           </a:p>
         </p:txBody>

</xml_diff>

<commit_message>
add new cross section for fault2 test instance
</commit_message>
<xml_diff>
--- a/TestInstances/GeologyScenarioForTesting.pptx
+++ b/TestInstances/GeologyScenarioForTesting.pptx
@@ -244,7 +244,7 @@
           <a:p>
             <a:fld id="{F3F0FDFC-A3F0-49EF-9F9E-7E3065794AD8}" type="datetimeFigureOut">
               <a:rPr lang="en-US" smtClean="0"/>
-              <a:t>11/4/2019</a:t>
+              <a:t>11/15/2019</a:t>
             </a:fld>
             <a:endParaRPr lang="en-US"/>
           </a:p>
@@ -414,7 +414,7 @@
           <a:p>
             <a:fld id="{F3F0FDFC-A3F0-49EF-9F9E-7E3065794AD8}" type="datetimeFigureOut">
               <a:rPr lang="en-US" smtClean="0"/>
-              <a:t>11/4/2019</a:t>
+              <a:t>11/15/2019</a:t>
             </a:fld>
             <a:endParaRPr lang="en-US"/>
           </a:p>
@@ -594,7 +594,7 @@
           <a:p>
             <a:fld id="{F3F0FDFC-A3F0-49EF-9F9E-7E3065794AD8}" type="datetimeFigureOut">
               <a:rPr lang="en-US" smtClean="0"/>
-              <a:t>11/4/2019</a:t>
+              <a:t>11/15/2019</a:t>
             </a:fld>
             <a:endParaRPr lang="en-US"/>
           </a:p>
@@ -764,7 +764,7 @@
           <a:p>
             <a:fld id="{F3F0FDFC-A3F0-49EF-9F9E-7E3065794AD8}" type="datetimeFigureOut">
               <a:rPr lang="en-US" smtClean="0"/>
-              <a:t>11/4/2019</a:t>
+              <a:t>11/15/2019</a:t>
             </a:fld>
             <a:endParaRPr lang="en-US"/>
           </a:p>
@@ -1008,7 +1008,7 @@
           <a:p>
             <a:fld id="{F3F0FDFC-A3F0-49EF-9F9E-7E3065794AD8}" type="datetimeFigureOut">
               <a:rPr lang="en-US" smtClean="0"/>
-              <a:t>11/4/2019</a:t>
+              <a:t>11/15/2019</a:t>
             </a:fld>
             <a:endParaRPr lang="en-US"/>
           </a:p>
@@ -1240,7 +1240,7 @@
           <a:p>
             <a:fld id="{F3F0FDFC-A3F0-49EF-9F9E-7E3065794AD8}" type="datetimeFigureOut">
               <a:rPr lang="en-US" smtClean="0"/>
-              <a:t>11/4/2019</a:t>
+              <a:t>11/15/2019</a:t>
             </a:fld>
             <a:endParaRPr lang="en-US"/>
           </a:p>
@@ -1607,7 +1607,7 @@
           <a:p>
             <a:fld id="{F3F0FDFC-A3F0-49EF-9F9E-7E3065794AD8}" type="datetimeFigureOut">
               <a:rPr lang="en-US" smtClean="0"/>
-              <a:t>11/4/2019</a:t>
+              <a:t>11/15/2019</a:t>
             </a:fld>
             <a:endParaRPr lang="en-US"/>
           </a:p>
@@ -1725,7 +1725,7 @@
           <a:p>
             <a:fld id="{F3F0FDFC-A3F0-49EF-9F9E-7E3065794AD8}" type="datetimeFigureOut">
               <a:rPr lang="en-US" smtClean="0"/>
-              <a:t>11/4/2019</a:t>
+              <a:t>11/15/2019</a:t>
             </a:fld>
             <a:endParaRPr lang="en-US"/>
           </a:p>
@@ -1820,7 +1820,7 @@
           <a:p>
             <a:fld id="{F3F0FDFC-A3F0-49EF-9F9E-7E3065794AD8}" type="datetimeFigureOut">
               <a:rPr lang="en-US" smtClean="0"/>
-              <a:t>11/4/2019</a:t>
+              <a:t>11/15/2019</a:t>
             </a:fld>
             <a:endParaRPr lang="en-US"/>
           </a:p>
@@ -2097,7 +2097,7 @@
           <a:p>
             <a:fld id="{F3F0FDFC-A3F0-49EF-9F9E-7E3065794AD8}" type="datetimeFigureOut">
               <a:rPr lang="en-US" smtClean="0"/>
-              <a:t>11/4/2019</a:t>
+              <a:t>11/15/2019</a:t>
             </a:fld>
             <a:endParaRPr lang="en-US"/>
           </a:p>
@@ -2354,7 +2354,7 @@
           <a:p>
             <a:fld id="{F3F0FDFC-A3F0-49EF-9F9E-7E3065794AD8}" type="datetimeFigureOut">
               <a:rPr lang="en-US" smtClean="0"/>
-              <a:t>11/4/2019</a:t>
+              <a:t>11/15/2019</a:t>
             </a:fld>
             <a:endParaRPr lang="en-US"/>
           </a:p>
@@ -2567,7 +2567,7 @@
           <a:p>
             <a:fld id="{F3F0FDFC-A3F0-49EF-9F9E-7E3065794AD8}" type="datetimeFigureOut">
               <a:rPr lang="en-US" smtClean="0"/>
-              <a:t>11/4/2019</a:t>
+              <a:t>11/15/2019</a:t>
             </a:fld>
             <a:endParaRPr lang="en-US"/>
           </a:p>

</xml_diff>